<commit_message>
update asthma results figures
</commit_message>
<xml_diff>
--- a/analyses/casestudy2_asthma/results/Figures/asthmaResults.pptx
+++ b/analyses/casestudy2_asthma/results/Figures/asthmaResults.pptx
@@ -208,7 +208,7 @@
           <a:p>
             <a:fld id="{D88FDA94-3028-154F-9925-79A44D3CB49B}" type="datetimeFigureOut">
               <a:rPr lang="en-US" smtClean="0"/>
-              <a:t>1/31/18</a:t>
+              <a:t>2/1/18</a:t>
             </a:fld>
             <a:endParaRPr lang="en-US"/>
           </a:p>
@@ -607,7 +607,7 @@
           <a:p>
             <a:fld id="{CB34F047-86A8-A44D-8F10-D5DF9101F963}" type="datetimeFigureOut">
               <a:rPr lang="en-US" smtClean="0"/>
-              <a:t>1/31/18</a:t>
+              <a:t>2/1/18</a:t>
             </a:fld>
             <a:endParaRPr lang="en-US"/>
           </a:p>
@@ -777,7 +777,7 @@
           <a:p>
             <a:fld id="{CB34F047-86A8-A44D-8F10-D5DF9101F963}" type="datetimeFigureOut">
               <a:rPr lang="en-US" smtClean="0"/>
-              <a:t>1/31/18</a:t>
+              <a:t>2/1/18</a:t>
             </a:fld>
             <a:endParaRPr lang="en-US"/>
           </a:p>
@@ -957,7 +957,7 @@
           <a:p>
             <a:fld id="{CB34F047-86A8-A44D-8F10-D5DF9101F963}" type="datetimeFigureOut">
               <a:rPr lang="en-US" smtClean="0"/>
-              <a:t>1/31/18</a:t>
+              <a:t>2/1/18</a:t>
             </a:fld>
             <a:endParaRPr lang="en-US"/>
           </a:p>
@@ -1127,7 +1127,7 @@
           <a:p>
             <a:fld id="{CB34F047-86A8-A44D-8F10-D5DF9101F963}" type="datetimeFigureOut">
               <a:rPr lang="en-US" smtClean="0"/>
-              <a:t>1/31/18</a:t>
+              <a:t>2/1/18</a:t>
             </a:fld>
             <a:endParaRPr lang="en-US"/>
           </a:p>
@@ -1373,7 +1373,7 @@
           <a:p>
             <a:fld id="{CB34F047-86A8-A44D-8F10-D5DF9101F963}" type="datetimeFigureOut">
               <a:rPr lang="en-US" smtClean="0"/>
-              <a:t>1/31/18</a:t>
+              <a:t>2/1/18</a:t>
             </a:fld>
             <a:endParaRPr lang="en-US"/>
           </a:p>
@@ -1605,7 +1605,7 @@
           <a:p>
             <a:fld id="{CB34F047-86A8-A44D-8F10-D5DF9101F963}" type="datetimeFigureOut">
               <a:rPr lang="en-US" smtClean="0"/>
-              <a:t>1/31/18</a:t>
+              <a:t>2/1/18</a:t>
             </a:fld>
             <a:endParaRPr lang="en-US"/>
           </a:p>
@@ -1972,7 +1972,7 @@
           <a:p>
             <a:fld id="{CB34F047-86A8-A44D-8F10-D5DF9101F963}" type="datetimeFigureOut">
               <a:rPr lang="en-US" smtClean="0"/>
-              <a:t>1/31/18</a:t>
+              <a:t>2/1/18</a:t>
             </a:fld>
             <a:endParaRPr lang="en-US"/>
           </a:p>
@@ -2090,7 +2090,7 @@
           <a:p>
             <a:fld id="{CB34F047-86A8-A44D-8F10-D5DF9101F963}" type="datetimeFigureOut">
               <a:rPr lang="en-US" smtClean="0"/>
-              <a:t>1/31/18</a:t>
+              <a:t>2/1/18</a:t>
             </a:fld>
             <a:endParaRPr lang="en-US"/>
           </a:p>
@@ -2185,7 +2185,7 @@
           <a:p>
             <a:fld id="{CB34F047-86A8-A44D-8F10-D5DF9101F963}" type="datetimeFigureOut">
               <a:rPr lang="en-US" smtClean="0"/>
-              <a:t>1/31/18</a:t>
+              <a:t>2/1/18</a:t>
             </a:fld>
             <a:endParaRPr lang="en-US"/>
           </a:p>
@@ -2462,7 +2462,7 @@
           <a:p>
             <a:fld id="{CB34F047-86A8-A44D-8F10-D5DF9101F963}" type="datetimeFigureOut">
               <a:rPr lang="en-US" smtClean="0"/>
-              <a:t>1/31/18</a:t>
+              <a:t>2/1/18</a:t>
             </a:fld>
             <a:endParaRPr lang="en-US"/>
           </a:p>
@@ -2715,7 +2715,7 @@
           <a:p>
             <a:fld id="{CB34F047-86A8-A44D-8F10-D5DF9101F963}" type="datetimeFigureOut">
               <a:rPr lang="en-US" smtClean="0"/>
-              <a:t>1/31/18</a:t>
+              <a:t>2/1/18</a:t>
             </a:fld>
             <a:endParaRPr lang="en-US"/>
           </a:p>
@@ -2928,7 +2928,7 @@
           <a:p>
             <a:fld id="{CB34F047-86A8-A44D-8F10-D5DF9101F963}" type="datetimeFigureOut">
               <a:rPr lang="en-US" smtClean="0"/>
-              <a:t>1/31/18</a:t>
+              <a:t>2/1/18</a:t>
             </a:fld>
             <a:endParaRPr lang="en-US"/>
           </a:p>
@@ -3333,6 +3333,35 @@
           <a:chExt cx="0" cy="0"/>
         </a:xfrm>
       </p:grpSpPr>
+      <p:pic>
+        <p:nvPicPr>
+          <p:cNvPr id="21" name="Picture 20"/>
+          <p:cNvPicPr>
+            <a:picLocks noChangeAspect="1"/>
+          </p:cNvPicPr>
+          <p:nvPr/>
+        </p:nvPicPr>
+        <p:blipFill rotWithShape="1">
+          <a:blip r:embed="rId2">
+            <a:extLst>
+              <a:ext uri="{28A0092B-C50C-407E-A947-70E740481C1C}">
+                <a14:useLocalDpi xmlns:a14="http://schemas.microsoft.com/office/drawing/2010/main" val="0"/>
+              </a:ext>
+            </a:extLst>
+          </a:blip>
+          <a:srcRect l="25152" b="9908"/>
+          <a:stretch/>
+        </p:blipFill>
+        <p:spPr>
+          <a:xfrm>
+            <a:off x="0" y="3272917"/>
+            <a:ext cx="4541003" cy="3123338"/>
+          </a:xfrm>
+          <a:prstGeom prst="rect">
+            <a:avLst/>
+          </a:prstGeom>
+        </p:spPr>
+      </p:pic>
       <p:sp>
         <p:nvSpPr>
           <p:cNvPr id="4" name="Rounded Rectangle 3"/>
@@ -3931,64 +3960,6 @@
           </a:fontRef>
         </p:style>
       </p:cxnSp>
-      <p:pic>
-        <p:nvPicPr>
-          <p:cNvPr id="19" name="Picture 18"/>
-          <p:cNvPicPr>
-            <a:picLocks noChangeAspect="1"/>
-          </p:cNvPicPr>
-          <p:nvPr/>
-        </p:nvPicPr>
-        <p:blipFill rotWithShape="1">
-          <a:blip r:embed="rId2">
-            <a:extLst>
-              <a:ext uri="{28A0092B-C50C-407E-A947-70E740481C1C}">
-                <a14:useLocalDpi xmlns:a14="http://schemas.microsoft.com/office/drawing/2010/main" val="0"/>
-              </a:ext>
-            </a:extLst>
-          </a:blip>
-          <a:srcRect r="66123"/>
-          <a:stretch/>
-        </p:blipFill>
-        <p:spPr>
-          <a:xfrm>
-            <a:off x="3668678" y="307412"/>
-            <a:ext cx="2940161" cy="2670470"/>
-          </a:xfrm>
-          <a:prstGeom prst="rect">
-            <a:avLst/>
-          </a:prstGeom>
-        </p:spPr>
-      </p:pic>
-      <p:pic>
-        <p:nvPicPr>
-          <p:cNvPr id="21" name="Picture 20"/>
-          <p:cNvPicPr>
-            <a:picLocks noChangeAspect="1"/>
-          </p:cNvPicPr>
-          <p:nvPr/>
-        </p:nvPicPr>
-        <p:blipFill rotWithShape="1">
-          <a:blip r:embed="rId3">
-            <a:extLst>
-              <a:ext uri="{28A0092B-C50C-407E-A947-70E740481C1C}">
-                <a14:useLocalDpi xmlns:a14="http://schemas.microsoft.com/office/drawing/2010/main" val="0"/>
-              </a:ext>
-            </a:extLst>
-          </a:blip>
-          <a:srcRect l="23814"/>
-          <a:stretch/>
-        </p:blipFill>
-        <p:spPr>
-          <a:xfrm>
-            <a:off x="2734" y="3256011"/>
-            <a:ext cx="4324657" cy="3243697"/>
-          </a:xfrm>
-          <a:prstGeom prst="rect">
-            <a:avLst/>
-          </a:prstGeom>
-        </p:spPr>
-      </p:pic>
       <p:sp>
         <p:nvSpPr>
           <p:cNvPr id="23" name="TextBox 22"/>
@@ -4192,64 +4163,6 @@
           </a:p>
         </p:txBody>
       </p:sp>
-      <p:pic>
-        <p:nvPicPr>
-          <p:cNvPr id="29" name="Picture 28"/>
-          <p:cNvPicPr>
-            <a:picLocks noChangeAspect="1"/>
-          </p:cNvPicPr>
-          <p:nvPr/>
-        </p:nvPicPr>
-        <p:blipFill rotWithShape="1">
-          <a:blip r:embed="rId2">
-            <a:extLst>
-              <a:ext uri="{28A0092B-C50C-407E-A947-70E740481C1C}">
-                <a14:useLocalDpi xmlns:a14="http://schemas.microsoft.com/office/drawing/2010/main" val="0"/>
-              </a:ext>
-            </a:extLst>
-          </a:blip>
-          <a:srcRect l="69828"/>
-          <a:stretch/>
-        </p:blipFill>
-        <p:spPr>
-          <a:xfrm>
-            <a:off x="9602207" y="307412"/>
-            <a:ext cx="2618596" cy="2670470"/>
-          </a:xfrm>
-          <a:prstGeom prst="rect">
-            <a:avLst/>
-          </a:prstGeom>
-        </p:spPr>
-      </p:pic>
-      <p:pic>
-        <p:nvPicPr>
-          <p:cNvPr id="30" name="Picture 29"/>
-          <p:cNvPicPr>
-            <a:picLocks noChangeAspect="1"/>
-          </p:cNvPicPr>
-          <p:nvPr/>
-        </p:nvPicPr>
-        <p:blipFill rotWithShape="1">
-          <a:blip r:embed="rId2">
-            <a:extLst>
-              <a:ext uri="{28A0092B-C50C-407E-A947-70E740481C1C}">
-                <a14:useLocalDpi xmlns:a14="http://schemas.microsoft.com/office/drawing/2010/main" val="0"/>
-              </a:ext>
-            </a:extLst>
-          </a:blip>
-          <a:srcRect l="33766" r="32752"/>
-          <a:stretch/>
-        </p:blipFill>
-        <p:spPr>
-          <a:xfrm>
-            <a:off x="6929208" y="307412"/>
-            <a:ext cx="2905883" cy="2670470"/>
-          </a:xfrm>
-          <a:prstGeom prst="rect">
-            <a:avLst/>
-          </a:prstGeom>
-        </p:spPr>
-      </p:pic>
       <p:pic>
         <p:nvPicPr>
           <p:cNvPr id="3" name="Picture 2"/>
@@ -4259,7 +4172,7 @@
           <p:nvPr/>
         </p:nvPicPr>
         <p:blipFill>
-          <a:blip r:embed="rId4">
+          <a:blip r:embed="rId3">
             <a:extLst>
               <a:ext uri="{28A0092B-C50C-407E-A947-70E740481C1C}">
                 <a14:useLocalDpi xmlns:a14="http://schemas.microsoft.com/office/drawing/2010/main" val="0"/>
@@ -4280,9 +4193,159 @@
           </a:prstGeom>
         </p:spPr>
       </p:pic>
+      <p:sp>
+        <p:nvSpPr>
+          <p:cNvPr id="2" name="TextBox 1"/>
+          <p:cNvSpPr txBox="1"/>
+          <p:nvPr/>
+        </p:nvSpPr>
+        <p:spPr>
+          <a:xfrm>
+            <a:off x="1523269" y="307412"/>
+            <a:ext cx="1320896" cy="2599812"/>
+          </a:xfrm>
+          <a:prstGeom prst="rect">
+            <a:avLst/>
+          </a:prstGeom>
+          <a:noFill/>
+          <a:ln w="38100">
+            <a:solidFill>
+              <a:schemeClr val="tx1"/>
+            </a:solidFill>
+            <a:prstDash val="dash"/>
+          </a:ln>
+        </p:spPr>
+        <p:txBody>
+          <a:bodyPr wrap="square" rtlCol="0">
+            <a:spAutoFit/>
+          </a:bodyPr>
+          <a:lstStyle/>
+          <a:p>
+            <a:endParaRPr lang="en-US"/>
+          </a:p>
+        </p:txBody>
+      </p:sp>
+      <p:sp>
+        <p:nvSpPr>
+          <p:cNvPr id="17" name="TextBox 16"/>
+          <p:cNvSpPr txBox="1"/>
+          <p:nvPr/>
+        </p:nvSpPr>
+        <p:spPr>
+          <a:xfrm>
+            <a:off x="1132352" y="0"/>
+            <a:ext cx="2174004" cy="307777"/>
+          </a:xfrm>
+          <a:prstGeom prst="rect">
+            <a:avLst/>
+          </a:prstGeom>
+          <a:noFill/>
+        </p:spPr>
+        <p:txBody>
+          <a:bodyPr wrap="square" rtlCol="0">
+            <a:spAutoFit/>
+          </a:bodyPr>
+          <a:lstStyle/>
+          <a:p>
+            <a:pPr algn="ctr"/>
+            <a:r>
+              <a:rPr lang="en-US" sz="1400" smtClean="0"/>
+              <a:t>Variance decomposition</a:t>
+            </a:r>
+            <a:endParaRPr lang="en-US" sz="1400" dirty="0"/>
+          </a:p>
+        </p:txBody>
+      </p:sp>
       <p:pic>
         <p:nvPicPr>
-          <p:cNvPr id="18" name="Picture 17"/>
+          <p:cNvPr id="20" name="Picture 19"/>
+          <p:cNvPicPr>
+            <a:picLocks noChangeAspect="1"/>
+          </p:cNvPicPr>
+          <p:nvPr/>
+        </p:nvPicPr>
+        <p:blipFill rotWithShape="1">
+          <a:blip r:embed="rId4">
+            <a:extLst>
+              <a:ext uri="{28A0092B-C50C-407E-A947-70E740481C1C}">
+                <a14:useLocalDpi xmlns:a14="http://schemas.microsoft.com/office/drawing/2010/main" val="0"/>
+              </a:ext>
+            </a:extLst>
+          </a:blip>
+          <a:srcRect l="69978"/>
+          <a:stretch/>
+        </p:blipFill>
+        <p:spPr>
+          <a:xfrm>
+            <a:off x="9527921" y="160488"/>
+            <a:ext cx="2577784" cy="2641933"/>
+          </a:xfrm>
+          <a:prstGeom prst="rect">
+            <a:avLst/>
+          </a:prstGeom>
+        </p:spPr>
+      </p:pic>
+      <p:pic>
+        <p:nvPicPr>
+          <p:cNvPr id="31" name="Picture 30"/>
+          <p:cNvPicPr>
+            <a:picLocks noChangeAspect="1"/>
+          </p:cNvPicPr>
+          <p:nvPr/>
+        </p:nvPicPr>
+        <p:blipFill rotWithShape="1">
+          <a:blip r:embed="rId4">
+            <a:extLst>
+              <a:ext uri="{28A0092B-C50C-407E-A947-70E740481C1C}">
+                <a14:useLocalDpi xmlns:a14="http://schemas.microsoft.com/office/drawing/2010/main" val="0"/>
+              </a:ext>
+            </a:extLst>
+          </a:blip>
+          <a:srcRect l="34059" r="32827"/>
+          <a:stretch/>
+        </p:blipFill>
+        <p:spPr>
+          <a:xfrm>
+            <a:off x="6905741" y="160488"/>
+            <a:ext cx="2843203" cy="2641933"/>
+          </a:xfrm>
+          <a:prstGeom prst="rect">
+            <a:avLst/>
+          </a:prstGeom>
+        </p:spPr>
+      </p:pic>
+      <p:pic>
+        <p:nvPicPr>
+          <p:cNvPr id="32" name="Picture 31"/>
+          <p:cNvPicPr>
+            <a:picLocks noChangeAspect="1"/>
+          </p:cNvPicPr>
+          <p:nvPr/>
+        </p:nvPicPr>
+        <p:blipFill rotWithShape="1">
+          <a:blip r:embed="rId4">
+            <a:extLst>
+              <a:ext uri="{28A0092B-C50C-407E-A947-70E740481C1C}">
+                <a14:useLocalDpi xmlns:a14="http://schemas.microsoft.com/office/drawing/2010/main" val="0"/>
+              </a:ext>
+            </a:extLst>
+          </a:blip>
+          <a:srcRect r="66019"/>
+          <a:stretch/>
+        </p:blipFill>
+        <p:spPr>
+          <a:xfrm>
+            <a:off x="3697273" y="160488"/>
+            <a:ext cx="2917729" cy="2641933"/>
+          </a:xfrm>
+          <a:prstGeom prst="rect">
+            <a:avLst/>
+          </a:prstGeom>
+        </p:spPr>
+      </p:pic>
+      <p:pic>
+        <p:nvPicPr>
+          <p:cNvPr id="19" name="Picture 18"/>
           <p:cNvPicPr>
             <a:picLocks noChangeAspect="1"/>
           </p:cNvPicPr>
@@ -4302,8 +4365,8 @@
         </p:blipFill>
         <p:spPr>
           <a:xfrm>
-            <a:off x="4327391" y="3006704"/>
-            <a:ext cx="3899766" cy="3899766"/>
+            <a:off x="4225244" y="3002637"/>
+            <a:ext cx="3842315" cy="3842315"/>
           </a:xfrm>
           <a:prstGeom prst="rect">
             <a:avLst/>

</xml_diff>